<commit_message>
adds new prelim results for varying cue and resuorce for storage effect
</commit_message>
<xml_diff>
--- a/devel/prelim_results_slides.pptx
+++ b/devel/prelim_results_slides.pptx
@@ -7,8 +7,10 @@
   <p:sldIdLst>
     <p:sldId id="258" r:id="rId2"/>
     <p:sldId id="259" r:id="rId3"/>
-    <p:sldId id="256" r:id="rId4"/>
-    <p:sldId id="257" r:id="rId5"/>
+    <p:sldId id="260" r:id="rId4"/>
+    <p:sldId id="261" r:id="rId5"/>
+    <p:sldId id="256" r:id="rId6"/>
+    <p:sldId id="257" r:id="rId7"/>
   </p:sldIdLst>
   <p:sldSz cx="12192000" cy="6858000"/>
   <p:notesSz cx="6858000" cy="9144000"/>
@@ -107,6 +109,11 @@
       </a:defRPr>
     </a:lvl9pPr>
   </p:defaultTextStyle>
+  <p:extLst>
+    <p:ext uri="{EFAFB233-063F-42B5-8137-9DF3F51BA10A}">
+      <p15:sldGuideLst xmlns:p15="http://schemas.microsoft.com/office/powerpoint/2012/main"/>
+    </p:ext>
+  </p:extLst>
 </p:presentation>
 </file>
 
@@ -241,7 +248,7 @@
           <a:p>
             <a:fld id="{CF673584-D370-534F-8C25-573708FC550A}" type="datetimeFigureOut">
               <a:rPr lang="en-US" smtClean="0"/>
-              <a:t>5/3/16</a:t>
+              <a:t>5/5/16</a:t>
             </a:fld>
             <a:endParaRPr lang="en-US"/>
           </a:p>
@@ -411,7 +418,7 @@
           <a:p>
             <a:fld id="{CF673584-D370-534F-8C25-573708FC550A}" type="datetimeFigureOut">
               <a:rPr lang="en-US" smtClean="0"/>
-              <a:t>5/3/16</a:t>
+              <a:t>5/5/16</a:t>
             </a:fld>
             <a:endParaRPr lang="en-US"/>
           </a:p>
@@ -591,7 +598,7 @@
           <a:p>
             <a:fld id="{CF673584-D370-534F-8C25-573708FC550A}" type="datetimeFigureOut">
               <a:rPr lang="en-US" smtClean="0"/>
-              <a:t>5/3/16</a:t>
+              <a:t>5/5/16</a:t>
             </a:fld>
             <a:endParaRPr lang="en-US"/>
           </a:p>
@@ -761,7 +768,7 @@
           <a:p>
             <a:fld id="{CF673584-D370-534F-8C25-573708FC550A}" type="datetimeFigureOut">
               <a:rPr lang="en-US" smtClean="0"/>
-              <a:t>5/3/16</a:t>
+              <a:t>5/5/16</a:t>
             </a:fld>
             <a:endParaRPr lang="en-US"/>
           </a:p>
@@ -1007,7 +1014,7 @@
           <a:p>
             <a:fld id="{CF673584-D370-534F-8C25-573708FC550A}" type="datetimeFigureOut">
               <a:rPr lang="en-US" smtClean="0"/>
-              <a:t>5/3/16</a:t>
+              <a:t>5/5/16</a:t>
             </a:fld>
             <a:endParaRPr lang="en-US"/>
           </a:p>
@@ -1239,7 +1246,7 @@
           <a:p>
             <a:fld id="{CF673584-D370-534F-8C25-573708FC550A}" type="datetimeFigureOut">
               <a:rPr lang="en-US" smtClean="0"/>
-              <a:t>5/3/16</a:t>
+              <a:t>5/5/16</a:t>
             </a:fld>
             <a:endParaRPr lang="en-US"/>
           </a:p>
@@ -1606,7 +1613,7 @@
           <a:p>
             <a:fld id="{CF673584-D370-534F-8C25-573708FC550A}" type="datetimeFigureOut">
               <a:rPr lang="en-US" smtClean="0"/>
-              <a:t>5/3/16</a:t>
+              <a:t>5/5/16</a:t>
             </a:fld>
             <a:endParaRPr lang="en-US"/>
           </a:p>
@@ -1724,7 +1731,7 @@
           <a:p>
             <a:fld id="{CF673584-D370-534F-8C25-573708FC550A}" type="datetimeFigureOut">
               <a:rPr lang="en-US" smtClean="0"/>
-              <a:t>5/3/16</a:t>
+              <a:t>5/5/16</a:t>
             </a:fld>
             <a:endParaRPr lang="en-US"/>
           </a:p>
@@ -1819,7 +1826,7 @@
           <a:p>
             <a:fld id="{CF673584-D370-534F-8C25-573708FC550A}" type="datetimeFigureOut">
               <a:rPr lang="en-US" smtClean="0"/>
-              <a:t>5/3/16</a:t>
+              <a:t>5/5/16</a:t>
             </a:fld>
             <a:endParaRPr lang="en-US"/>
           </a:p>
@@ -2096,7 +2103,7 @@
           <a:p>
             <a:fld id="{CF673584-D370-534F-8C25-573708FC550A}" type="datetimeFigureOut">
               <a:rPr lang="en-US" smtClean="0"/>
-              <a:t>5/3/16</a:t>
+              <a:t>5/5/16</a:t>
             </a:fld>
             <a:endParaRPr lang="en-US"/>
           </a:p>
@@ -2349,7 +2356,7 @@
           <a:p>
             <a:fld id="{CF673584-D370-534F-8C25-573708FC550A}" type="datetimeFigureOut">
               <a:rPr lang="en-US" smtClean="0"/>
-              <a:t>5/3/16</a:t>
+              <a:t>5/5/16</a:t>
             </a:fld>
             <a:endParaRPr lang="en-US"/>
           </a:p>
@@ -2562,7 +2569,7 @@
           <a:p>
             <a:fld id="{CF673584-D370-534F-8C25-573708FC550A}" type="datetimeFigureOut">
               <a:rPr lang="en-US" smtClean="0"/>
-              <a:t>5/3/16</a:t>
+              <a:t>5/5/16</a:t>
             </a:fld>
             <a:endParaRPr lang="en-US"/>
           </a:p>
@@ -3163,6 +3170,327 @@
           <a:chExt cx="0" cy="0"/>
         </a:xfrm>
       </p:grpSpPr>
+      <p:sp>
+        <p:nvSpPr>
+          <p:cNvPr id="2" name="Title 1"/>
+          <p:cNvSpPr>
+            <a:spLocks noGrp="1"/>
+          </p:cNvSpPr>
+          <p:nvPr>
+            <p:ph type="title"/>
+          </p:nvPr>
+        </p:nvSpPr>
+        <p:spPr>
+          <a:xfrm>
+            <a:off x="838200" y="-260552"/>
+            <a:ext cx="10515600" cy="1458119"/>
+          </a:xfrm>
+        </p:spPr>
+        <p:txBody>
+          <a:bodyPr/>
+          <a:lstStyle/>
+          <a:p>
+            <a:r>
+              <a:rPr lang="en-US" dirty="0" smtClean="0"/>
+              <a:t>STORAGE EFFECT</a:t>
+            </a:r>
+            <a:endParaRPr lang="en-US" dirty="0"/>
+          </a:p>
+        </p:txBody>
+      </p:sp>
+      <p:pic>
+        <p:nvPicPr>
+          <p:cNvPr id="4" name="Picture 3"/>
+          <p:cNvPicPr>
+            <a:picLocks noChangeAspect="1"/>
+          </p:cNvPicPr>
+          <p:nvPr/>
+        </p:nvPicPr>
+        <p:blipFill>
+          <a:blip r:embed="rId2">
+            <a:extLst>
+              <a:ext uri="{28A0092B-C50C-407E-A947-70E740481C1C}">
+                <a14:useLocalDpi xmlns:a14="http://schemas.microsoft.com/office/drawing/2010/main" val="0"/>
+              </a:ext>
+            </a:extLst>
+          </a:blip>
+          <a:stretch>
+            <a:fillRect/>
+          </a:stretch>
+        </p:blipFill>
+        <p:spPr>
+          <a:xfrm>
+            <a:off x="1946246" y="1450228"/>
+            <a:ext cx="2506214" cy="5012428"/>
+          </a:xfrm>
+          <a:prstGeom prst="rect">
+            <a:avLst/>
+          </a:prstGeom>
+        </p:spPr>
+      </p:pic>
+      <p:pic>
+        <p:nvPicPr>
+          <p:cNvPr id="5" name="Picture 4"/>
+          <p:cNvPicPr>
+            <a:picLocks noChangeAspect="1"/>
+          </p:cNvPicPr>
+          <p:nvPr/>
+        </p:nvPicPr>
+        <p:blipFill>
+          <a:blip r:embed="rId3">
+            <a:extLst>
+              <a:ext uri="{28A0092B-C50C-407E-A947-70E740481C1C}">
+                <a14:useLocalDpi xmlns:a14="http://schemas.microsoft.com/office/drawing/2010/main" val="0"/>
+              </a:ext>
+            </a:extLst>
+          </a:blip>
+          <a:stretch>
+            <a:fillRect/>
+          </a:stretch>
+        </p:blipFill>
+        <p:spPr>
+          <a:xfrm>
+            <a:off x="4570795" y="1450228"/>
+            <a:ext cx="2506214" cy="5012428"/>
+          </a:xfrm>
+          <a:prstGeom prst="rect">
+            <a:avLst/>
+          </a:prstGeom>
+        </p:spPr>
+      </p:pic>
+      <p:pic>
+        <p:nvPicPr>
+          <p:cNvPr id="6" name="Picture 5"/>
+          <p:cNvPicPr>
+            <a:picLocks noChangeAspect="1"/>
+          </p:cNvPicPr>
+          <p:nvPr/>
+        </p:nvPicPr>
+        <p:blipFill>
+          <a:blip r:embed="rId4">
+            <a:extLst>
+              <a:ext uri="{28A0092B-C50C-407E-A947-70E740481C1C}">
+                <a14:useLocalDpi xmlns:a14="http://schemas.microsoft.com/office/drawing/2010/main" val="0"/>
+              </a:ext>
+            </a:extLst>
+          </a:blip>
+          <a:stretch>
+            <a:fillRect/>
+          </a:stretch>
+        </p:blipFill>
+        <p:spPr>
+          <a:xfrm>
+            <a:off x="7195344" y="1449857"/>
+            <a:ext cx="2506400" cy="5012799"/>
+          </a:xfrm>
+          <a:prstGeom prst="rect">
+            <a:avLst/>
+          </a:prstGeom>
+        </p:spPr>
+      </p:pic>
+      <p:sp>
+        <p:nvSpPr>
+          <p:cNvPr id="7" name="TextBox 6"/>
+          <p:cNvSpPr txBox="1"/>
+          <p:nvPr/>
+        </p:nvSpPr>
+        <p:spPr>
+          <a:xfrm>
+            <a:off x="2205321" y="1337419"/>
+            <a:ext cx="2219390" cy="276999"/>
+          </a:xfrm>
+          <a:prstGeom prst="rect">
+            <a:avLst/>
+          </a:prstGeom>
+          <a:noFill/>
+        </p:spPr>
+        <p:txBody>
+          <a:bodyPr wrap="none" rtlCol="0">
+            <a:spAutoFit/>
+          </a:bodyPr>
+          <a:lstStyle/>
+          <a:p>
+            <a:r>
+              <a:rPr lang="en-US" sz="1200" dirty="0" smtClean="0"/>
+              <a:t>Constant annual resource supply</a:t>
+            </a:r>
+            <a:endParaRPr lang="en-US" sz="1200" dirty="0"/>
+          </a:p>
+        </p:txBody>
+      </p:sp>
+      <p:sp>
+        <p:nvSpPr>
+          <p:cNvPr id="8" name="TextBox 7"/>
+          <p:cNvSpPr txBox="1"/>
+          <p:nvPr/>
+        </p:nvSpPr>
+        <p:spPr>
+          <a:xfrm>
+            <a:off x="4764132" y="1362405"/>
+            <a:ext cx="2312877" cy="276999"/>
+          </a:xfrm>
+          <a:prstGeom prst="rect">
+            <a:avLst/>
+          </a:prstGeom>
+          <a:noFill/>
+        </p:spPr>
+        <p:txBody>
+          <a:bodyPr wrap="none" rtlCol="0">
+            <a:spAutoFit/>
+          </a:bodyPr>
+          <a:lstStyle/>
+          <a:p>
+            <a:r>
+              <a:rPr lang="en-US" sz="1200" dirty="0" smtClean="0"/>
+              <a:t>Variance of environmental cue = 2</a:t>
+            </a:r>
+            <a:endParaRPr lang="en-US" sz="1200" dirty="0"/>
+          </a:p>
+        </p:txBody>
+      </p:sp>
+      <p:sp>
+        <p:nvSpPr>
+          <p:cNvPr id="9" name="TextBox 8"/>
+          <p:cNvSpPr txBox="1"/>
+          <p:nvPr/>
+        </p:nvSpPr>
+        <p:spPr>
+          <a:xfrm>
+            <a:off x="7195344" y="1362405"/>
+            <a:ext cx="2883418" cy="276999"/>
+          </a:xfrm>
+          <a:prstGeom prst="rect">
+            <a:avLst/>
+          </a:prstGeom>
+          <a:noFill/>
+        </p:spPr>
+        <p:txBody>
+          <a:bodyPr wrap="none" rtlCol="0">
+            <a:spAutoFit/>
+          </a:bodyPr>
+          <a:lstStyle/>
+          <a:p>
+            <a:r>
+              <a:rPr lang="en-US" sz="1200" dirty="0" smtClean="0"/>
+              <a:t>Correlation of environmental responses = 0</a:t>
+            </a:r>
+            <a:endParaRPr lang="en-US" sz="1200" dirty="0"/>
+          </a:p>
+        </p:txBody>
+      </p:sp>
+    </p:spTree>
+    <p:extLst>
+      <p:ext uri="{BB962C8B-B14F-4D97-AF65-F5344CB8AC3E}">
+        <p14:creationId xmlns:p14="http://schemas.microsoft.com/office/powerpoint/2010/main" val="867031734"/>
+      </p:ext>
+    </p:extLst>
+  </p:cSld>
+  <p:clrMapOvr>
+    <a:masterClrMapping/>
+  </p:clrMapOvr>
+</p:sld>
+</file>
+
+<file path=ppt/slides/slide4.xml><?xml version="1.0" encoding="utf-8"?>
+<p:sld xmlns:a="http://schemas.openxmlformats.org/drawingml/2006/main" xmlns:r="http://schemas.openxmlformats.org/officeDocument/2006/relationships" xmlns:p="http://schemas.openxmlformats.org/presentationml/2006/main">
+  <p:cSld>
+    <p:spTree>
+      <p:nvGrpSpPr>
+        <p:cNvPr id="1" name=""/>
+        <p:cNvGrpSpPr/>
+        <p:nvPr/>
+      </p:nvGrpSpPr>
+      <p:grpSpPr>
+        <a:xfrm>
+          <a:off x="0" y="0"/>
+          <a:ext cx="0" cy="0"/>
+          <a:chOff x="0" y="0"/>
+          <a:chExt cx="0" cy="0"/>
+        </a:xfrm>
+      </p:grpSpPr>
+      <p:sp>
+        <p:nvSpPr>
+          <p:cNvPr id="2" name="Title 1"/>
+          <p:cNvSpPr>
+            <a:spLocks noGrp="1"/>
+          </p:cNvSpPr>
+          <p:nvPr>
+            <p:ph type="title"/>
+          </p:nvPr>
+        </p:nvSpPr>
+        <p:spPr/>
+        <p:txBody>
+          <a:bodyPr/>
+          <a:lstStyle/>
+          <a:p>
+            <a:r>
+              <a:rPr lang="en-US" dirty="0" smtClean="0"/>
+              <a:t>RELATIVE NONLINEARITY</a:t>
+            </a:r>
+            <a:endParaRPr lang="en-US" dirty="0"/>
+          </a:p>
+        </p:txBody>
+      </p:sp>
+      <p:pic>
+        <p:nvPicPr>
+          <p:cNvPr id="4" name="Picture 3"/>
+          <p:cNvPicPr>
+            <a:picLocks noChangeAspect="1"/>
+          </p:cNvPicPr>
+          <p:nvPr/>
+        </p:nvPicPr>
+        <p:blipFill>
+          <a:blip r:embed="rId2">
+            <a:extLst>
+              <a:ext uri="{28A0092B-C50C-407E-A947-70E740481C1C}">
+                <a14:useLocalDpi xmlns:a14="http://schemas.microsoft.com/office/drawing/2010/main" val="0"/>
+              </a:ext>
+            </a:extLst>
+          </a:blip>
+          <a:stretch>
+            <a:fillRect/>
+          </a:stretch>
+        </p:blipFill>
+        <p:spPr>
+          <a:xfrm>
+            <a:off x="4603376" y="1690688"/>
+            <a:ext cx="2464398" cy="4928796"/>
+          </a:xfrm>
+          <a:prstGeom prst="rect">
+            <a:avLst/>
+          </a:prstGeom>
+        </p:spPr>
+      </p:pic>
+    </p:spTree>
+    <p:extLst>
+      <p:ext uri="{BB962C8B-B14F-4D97-AF65-F5344CB8AC3E}">
+        <p14:creationId xmlns:p14="http://schemas.microsoft.com/office/powerpoint/2010/main" val="1564625264"/>
+      </p:ext>
+    </p:extLst>
+  </p:cSld>
+  <p:clrMapOvr>
+    <a:masterClrMapping/>
+  </p:clrMapOvr>
+</p:sld>
+</file>
+
+<file path=ppt/slides/slide5.xml><?xml version="1.0" encoding="utf-8"?>
+<p:sld xmlns:a="http://schemas.openxmlformats.org/drawingml/2006/main" xmlns:r="http://schemas.openxmlformats.org/officeDocument/2006/relationships" xmlns:p="http://schemas.openxmlformats.org/presentationml/2006/main">
+  <p:cSld>
+    <p:spTree>
+      <p:nvGrpSpPr>
+        <p:cNvPr id="1" name=""/>
+        <p:cNvGrpSpPr/>
+        <p:nvPr/>
+      </p:nvGrpSpPr>
+      <p:grpSpPr>
+        <a:xfrm>
+          <a:off x="0" y="0"/>
+          <a:ext cx="0" cy="0"/>
+          <a:chOff x="0" y="0"/>
+          <a:chExt cx="0" cy="0"/>
+        </a:xfrm>
+      </p:grpSpPr>
       <p:pic>
         <p:nvPicPr>
           <p:cNvPr id="5" name="Picture 4"/>
@@ -3379,7 +3707,7 @@
 </p:sld>
 </file>
 
-<file path=ppt/slides/slide4.xml><?xml version="1.0" encoding="utf-8"?>
+<file path=ppt/slides/slide6.xml><?xml version="1.0" encoding="utf-8"?>
 <p:sld xmlns:a="http://schemas.openxmlformats.org/drawingml/2006/main" xmlns:r="http://schemas.openxmlformats.org/officeDocument/2006/relationships" xmlns:p="http://schemas.openxmlformats.org/presentationml/2006/main">
   <p:cSld>
     <p:spTree>

</xml_diff>